<commit_message>
add small version of wordnet_example figure
</commit_message>
<xml_diff>
--- a/figures_new/wordnet_example.pptx
+++ b/figures_new/wordnet_example.pptx
@@ -104,6 +104,11 @@
       </a:defRPr>
     </a:lvl9pPr>
   </p:defaultTextStyle>
+  <p:extLst>
+    <p:ext uri="{EFAFB233-063F-42B5-8137-9DF3F51BA10A}">
+      <p15:sldGuideLst xmlns:p15="http://schemas.microsoft.com/office/powerpoint/2012/main"/>
+    </p:ext>
+  </p:extLst>
 </p:presentation>
 </file>
 
@@ -8389,9 +8394,7 @@
                   </a:path>
                 </a:pathLst>
               </a:custGeom>
-              <a:solidFill>
-                <a:schemeClr val="bg1"/>
-              </a:solidFill>
+              <a:noFill/>
               <a:ln>
                 <a:noFill/>
               </a:ln>

</xml_diff>